<commit_message>
FY23Q2 refresh - msteams-sso
- run through all exercise steps in associated MSLearn module to validate good working order
- updated steps & fixed typos where necessary
- updated slides where necessary
- update code samples to reflect MSLearn HOL exercise refresh & updates
- any & all users/names/company names/pictures/IDs are not real people/tenants... all are from M365 demo tenants provided by Microsoft
</commit_message>
<xml_diff>
--- a/Teams/80 Using Single Sign-On with Microsoft Teams/slides.pptx
+++ b/Teams/80 Using Single Sign-On with Microsoft Teams/slides.pptx
@@ -292,7 +292,7 @@
           <a:p>
             <a:fld id="{F5D67128-0ED3-F84C-AB75-26956BD6F773}" type="datetimeFigureOut">
               <a:rPr lang="en-US" smtClean="0"/>
-              <a:t>5/26/21</a:t>
+              <a:t>12/4/22</a:t>
             </a:fld>
             <a:endParaRPr lang="en-US"/>
           </a:p>
@@ -469,7 +469,7 @@
           <a:p>
             <a:fld id="{9E65F564-29A8-0243-B41B-CCCF740F82F1}" type="datetimeFigureOut">
               <a:rPr lang="en-US" smtClean="0"/>
-              <a:t>5/26/21</a:t>
+              <a:t>12/4/22</a:t>
             </a:fld>
             <a:endParaRPr lang="en-US"/>
           </a:p>
@@ -7262,13 +7262,13 @@
         </p:nvSpPr>
         <p:spPr>
           <a:xfrm>
-            <a:off x="6293802" y="1605275"/>
-            <a:ext cx="5602292" cy="3647449"/>
+            <a:off x="5956183" y="1605275"/>
+            <a:ext cx="5939911" cy="3647449"/>
           </a:xfrm>
         </p:spPr>
         <p:txBody>
           <a:bodyPr>
-            <a:normAutofit/>
+            <a:normAutofit fontScale="92500" lnSpcReduction="20000"/>
           </a:bodyPr>
           <a:lstStyle/>
           <a:p>
@@ -7280,7 +7280,7 @@
                 <a:latin typeface="Courier New" panose="02070309020205020404" pitchFamily="49" charset="0"/>
                 <a:cs typeface="Courier New" panose="02070309020205020404" pitchFamily="49" charset="0"/>
               </a:rPr>
-              <a:t>microsoftTeams.authentication.getAuthToken</a:t>
+              <a:t>authentication.getAuthToken</a:t>
             </a:r>
             <a:r>
               <a:rPr lang="en-US" sz="1600" dirty="0">
@@ -7299,6 +7299,79 @@
                 <a:latin typeface="Courier New" panose="02070309020205020404" pitchFamily="49" charset="0"/>
                 <a:cs typeface="Courier New" panose="02070309020205020404" pitchFamily="49" charset="0"/>
               </a:rPr>
+              <a:t>    resources: [</a:t>
+            </a:r>
+            <a:r>
+              <a:rPr lang="en-US" sz="1600" dirty="0" err="1">
+                <a:latin typeface="Courier New" panose="02070309020205020404" pitchFamily="49" charset="0"/>
+                <a:cs typeface="Courier New" panose="02070309020205020404" pitchFamily="49" charset="0"/>
+              </a:rPr>
+              <a:t>process.env.TAB_APP_URI</a:t>
+            </a:r>
+            <a:r>
+              <a:rPr lang="en-US" sz="1600" dirty="0">
+                <a:latin typeface="Courier New" panose="02070309020205020404" pitchFamily="49" charset="0"/>
+                <a:cs typeface="Courier New" panose="02070309020205020404" pitchFamily="49" charset="0"/>
+              </a:rPr>
+              <a:t>],</a:t>
+            </a:r>
+          </a:p>
+          <a:p>
+            <a:pPr marL="0" indent="0">
+              <a:buNone/>
+            </a:pPr>
+            <a:r>
+              <a:rPr lang="en-US" sz="1600" dirty="0">
+                <a:latin typeface="Courier New" panose="02070309020205020404" pitchFamily="49" charset="0"/>
+                <a:cs typeface="Courier New" panose="02070309020205020404" pitchFamily="49" charset="0"/>
+              </a:rPr>
+              <a:t>    silent: false</a:t>
+            </a:r>
+          </a:p>
+          <a:p>
+            <a:pPr marL="0" indent="0">
+              <a:buNone/>
+            </a:pPr>
+            <a:r>
+              <a:rPr lang="en-US" sz="1600" dirty="0">
+                <a:latin typeface="Courier New" panose="02070309020205020404" pitchFamily="49" charset="0"/>
+                <a:cs typeface="Courier New" panose="02070309020205020404" pitchFamily="49" charset="0"/>
+              </a:rPr>
+              <a:t>  } as </a:t>
+            </a:r>
+            <a:r>
+              <a:rPr lang="en-US" sz="1600" dirty="0" err="1">
+                <a:latin typeface="Courier New" panose="02070309020205020404" pitchFamily="49" charset="0"/>
+                <a:cs typeface="Courier New" panose="02070309020205020404" pitchFamily="49" charset="0"/>
+              </a:rPr>
+              <a:t>authentication.AuthTokenRequestParameters</a:t>
+            </a:r>
+            <a:endParaRPr lang="en-US" sz="1600" dirty="0">
+              <a:latin typeface="Courier New" panose="02070309020205020404" pitchFamily="49" charset="0"/>
+              <a:cs typeface="Courier New" panose="02070309020205020404" pitchFamily="49" charset="0"/>
+            </a:endParaRPr>
+          </a:p>
+          <a:p>
+            <a:pPr marL="0" indent="0">
+              <a:buNone/>
+            </a:pPr>
+            <a:r>
+              <a:rPr lang="en-US" sz="1600" dirty="0">
+                <a:latin typeface="Courier New" panose="02070309020205020404" pitchFamily="49" charset="0"/>
+                <a:cs typeface="Courier New" panose="02070309020205020404" pitchFamily="49" charset="0"/>
+              </a:rPr>
+              <a:t>).then(token =&gt; {</a:t>
+            </a:r>
+          </a:p>
+          <a:p>
+            <a:pPr marL="0" indent="0">
+              <a:buNone/>
+            </a:pPr>
+            <a:r>
+              <a:rPr lang="en-US" sz="1600" dirty="0">
+                <a:latin typeface="Courier New" panose="02070309020205020404" pitchFamily="49" charset="0"/>
+                <a:cs typeface="Courier New" panose="02070309020205020404" pitchFamily="49" charset="0"/>
+              </a:rPr>
               <a:t>  </a:t>
             </a:r>
             <a:r>
@@ -7306,14 +7379,14 @@
                 <a:latin typeface="Courier New" panose="02070309020205020404" pitchFamily="49" charset="0"/>
                 <a:cs typeface="Courier New" panose="02070309020205020404" pitchFamily="49" charset="0"/>
               </a:rPr>
-              <a:t>successCallback</a:t>
+              <a:t>app.notifySuccess</a:t>
             </a:r>
             <a:r>
               <a:rPr lang="en-US" sz="1600" dirty="0">
                 <a:latin typeface="Courier New" panose="02070309020205020404" pitchFamily="49" charset="0"/>
                 <a:cs typeface="Courier New" panose="02070309020205020404" pitchFamily="49" charset="0"/>
               </a:rPr>
-              <a:t>: (result: string) =&gt; { </a:t>
+              <a:t>();</a:t>
             </a:r>
           </a:p>
           <a:p>
@@ -7325,21 +7398,33 @@
                 <a:latin typeface="Courier New" panose="02070309020205020404" pitchFamily="49" charset="0"/>
                 <a:cs typeface="Courier New" panose="02070309020205020404" pitchFamily="49" charset="0"/>
               </a:rPr>
-              <a:t>    </a:t>
+              <a:t>}).catch(message =&gt; {</a:t>
+            </a:r>
+          </a:p>
+          <a:p>
+            <a:pPr marL="0" indent="0">
+              <a:buNone/>
+            </a:pPr>
+            <a:r>
+              <a:rPr lang="en-US" sz="1600" dirty="0">
+                <a:latin typeface="Courier New" panose="02070309020205020404" pitchFamily="49" charset="0"/>
+                <a:cs typeface="Courier New" panose="02070309020205020404" pitchFamily="49" charset="0"/>
+              </a:rPr>
+              <a:t>  </a:t>
             </a:r>
             <a:r>
               <a:rPr lang="en-US" sz="1600" dirty="0" err="1">
                 <a:latin typeface="Courier New" panose="02070309020205020404" pitchFamily="49" charset="0"/>
                 <a:cs typeface="Courier New" panose="02070309020205020404" pitchFamily="49" charset="0"/>
               </a:rPr>
-              <a:t>this.ssoLoginSuccess</a:t>
+              <a:t>app.notifyFailure</a:t>
             </a:r>
             <a:r>
               <a:rPr lang="en-US" sz="1600" dirty="0">
                 <a:latin typeface="Courier New" panose="02070309020205020404" pitchFamily="49" charset="0"/>
                 <a:cs typeface="Courier New" panose="02070309020205020404" pitchFamily="49" charset="0"/>
               </a:rPr>
-              <a:t>(result) </a:t>
+              <a:t>({</a:t>
             </a:r>
           </a:p>
           <a:p>
@@ -7351,7 +7436,21 @@
                 <a:latin typeface="Courier New" panose="02070309020205020404" pitchFamily="49" charset="0"/>
                 <a:cs typeface="Courier New" panose="02070309020205020404" pitchFamily="49" charset="0"/>
               </a:rPr>
-              <a:t>  },</a:t>
+              <a:t>    reason: </a:t>
+            </a:r>
+            <a:r>
+              <a:rPr lang="en-US" sz="1600" dirty="0" err="1">
+                <a:latin typeface="Courier New" panose="02070309020205020404" pitchFamily="49" charset="0"/>
+                <a:cs typeface="Courier New" panose="02070309020205020404" pitchFamily="49" charset="0"/>
+              </a:rPr>
+              <a:t>app.FailedReason.AuthFailed</a:t>
+            </a:r>
+            <a:r>
+              <a:rPr lang="en-US" sz="1600" dirty="0">
+                <a:latin typeface="Courier New" panose="02070309020205020404" pitchFamily="49" charset="0"/>
+                <a:cs typeface="Courier New" panose="02070309020205020404" pitchFamily="49" charset="0"/>
+              </a:rPr>
+              <a:t>,</a:t>
             </a:r>
           </a:p>
           <a:p>
@@ -7363,21 +7462,19 @@
                 <a:latin typeface="Courier New" panose="02070309020205020404" pitchFamily="49" charset="0"/>
                 <a:cs typeface="Courier New" panose="02070309020205020404" pitchFamily="49" charset="0"/>
               </a:rPr>
-              <a:t>  </a:t>
-            </a:r>
-            <a:r>
-              <a:rPr lang="en-US" sz="1600" dirty="0" err="1">
-                <a:latin typeface="Courier New" panose="02070309020205020404" pitchFamily="49" charset="0"/>
-                <a:cs typeface="Courier New" panose="02070309020205020404" pitchFamily="49" charset="0"/>
-              </a:rPr>
-              <a:t>failureCallback</a:t>
-            </a:r>
+              <a:t>    message</a:t>
+            </a:r>
+          </a:p>
+          <a:p>
+            <a:pPr marL="0" indent="0">
+              <a:buNone/>
+            </a:pPr>
             <a:r>
               <a:rPr lang="en-US" sz="1600" dirty="0">
                 <a:latin typeface="Courier New" panose="02070309020205020404" pitchFamily="49" charset="0"/>
                 <a:cs typeface="Courier New" panose="02070309020205020404" pitchFamily="49" charset="0"/>
               </a:rPr>
-              <a:t>: (error: string) =&gt; { </a:t>
+              <a:t>  });</a:t>
             </a:r>
           </a:p>
           <a:p>
@@ -7389,49 +7486,8 @@
                 <a:latin typeface="Courier New" panose="02070309020205020404" pitchFamily="49" charset="0"/>
                 <a:cs typeface="Courier New" panose="02070309020205020404" pitchFamily="49" charset="0"/>
               </a:rPr>
-              <a:t>    </a:t>
-            </a:r>
-            <a:r>
-              <a:rPr lang="en-US" sz="1600" dirty="0" err="1">
-                <a:latin typeface="Courier New" panose="02070309020205020404" pitchFamily="49" charset="0"/>
-                <a:cs typeface="Courier New" panose="02070309020205020404" pitchFamily="49" charset="0"/>
-              </a:rPr>
-              <a:t>this.ssoLoginFailure</a:t>
-            </a:r>
-            <a:r>
-              <a:rPr lang="en-US" sz="1600" dirty="0">
-                <a:latin typeface="Courier New" panose="02070309020205020404" pitchFamily="49" charset="0"/>
-                <a:cs typeface="Courier New" panose="02070309020205020404" pitchFamily="49" charset="0"/>
-              </a:rPr>
-              <a:t>(error) </a:t>
-            </a:r>
-          </a:p>
-          <a:p>
-            <a:pPr marL="0" indent="0">
-              <a:buNone/>
-            </a:pPr>
-            <a:r>
-              <a:rPr lang="en-US" sz="1600" dirty="0">
-                <a:latin typeface="Courier New" panose="02070309020205020404" pitchFamily="49" charset="0"/>
-                <a:cs typeface="Courier New" panose="02070309020205020404" pitchFamily="49" charset="0"/>
-              </a:rPr>
-              <a:t>  }</a:t>
-            </a:r>
-          </a:p>
-          <a:p>
-            <a:pPr marL="0" indent="0">
-              <a:buNone/>
-            </a:pPr>
-            <a:r>
-              <a:rPr lang="en-US" sz="1600" dirty="0">
-                <a:latin typeface="Courier New" panose="02070309020205020404" pitchFamily="49" charset="0"/>
-                <a:cs typeface="Courier New" panose="02070309020205020404" pitchFamily="49" charset="0"/>
-              </a:rPr>
               <a:t>});</a:t>
             </a:r>
-          </a:p>
-          <a:p>
-            <a:endParaRPr lang="en-US" sz="1600" dirty="0"/>
           </a:p>
         </p:txBody>
       </p:sp>
@@ -7612,7 +7668,7 @@
         </p:spPr>
         <p:txBody>
           <a:bodyPr>
-            <a:normAutofit fontScale="92500" lnSpcReduction="20000"/>
+            <a:normAutofit/>
           </a:bodyPr>
           <a:lstStyle/>
           <a:p>
@@ -7622,14 +7678,14 @@
               </a:spcBef>
             </a:pPr>
             <a:r>
-              <a:rPr lang="en-US" dirty="0"/>
+              <a:rPr lang="en-US" sz="2000" dirty="0"/>
               <a:t>Use the ID token obtained by Microsoft Teams to obtain</a:t>
             </a:r>
             <a:br>
-              <a:rPr lang="en-US" dirty="0"/>
+              <a:rPr lang="en-US" sz="2000" dirty="0"/>
             </a:br>
             <a:r>
-              <a:rPr lang="en-US" dirty="0"/>
+              <a:rPr lang="en-US" sz="2000" dirty="0"/>
               <a:t>an access token that can be authorized to call Microsoft Graph</a:t>
             </a:r>
           </a:p>
@@ -7640,15 +7696,8 @@
               </a:spcBef>
             </a:pPr>
             <a:r>
-              <a:rPr lang="en-US" dirty="0"/>
-              <a:t>Use the OAuth2 on-behalf-of flow to obtain a token to </a:t>
-            </a:r>
-            <a:br>
-              <a:rPr lang="en-US" dirty="0"/>
-            </a:br>
-            <a:r>
-              <a:rPr lang="en-US" dirty="0"/>
-              <a:t>call Microsoft Graph</a:t>
+              <a:rPr lang="en-US" sz="2000" dirty="0"/>
+              <a:t>Use the OAuth2 on-behalf-of flow to obtain a token to call Microsoft Graph</a:t>
             </a:r>
           </a:p>
           <a:p>
@@ -7658,12 +7707,12 @@
               </a:spcBef>
             </a:pPr>
             <a:r>
-              <a:rPr lang="en-US" dirty="0"/>
+              <a:rPr lang="en-US" sz="2000" dirty="0"/>
               <a:t>This exchange must happen in a server-side API, not client-side</a:t>
             </a:r>
           </a:p>
           <a:p>
-            <a:endParaRPr lang="en-US" dirty="0"/>
+            <a:endParaRPr lang="en-US" sz="2000" dirty="0"/>
           </a:p>
         </p:txBody>
       </p:sp>
@@ -7681,8 +7730,8 @@
         </p:nvSpPr>
         <p:spPr>
           <a:xfrm>
-            <a:off x="838200" y="3850640"/>
-            <a:ext cx="10515600" cy="2585323"/>
+            <a:off x="838200" y="3429000"/>
+            <a:ext cx="10515600" cy="2862322"/>
           </a:xfrm>
           <a:prstGeom prst="rect">
             <a:avLst/>
@@ -7697,6 +7746,9 @@
           <a:p>
             <a:r>
               <a:rPr lang="en-US" dirty="0">
+                <a:solidFill>
+                  <a:srgbClr val="3F115C"/>
+                </a:solidFill>
                 <a:latin typeface="Courier New" panose="02070309020205020404" pitchFamily="49" charset="0"/>
                 <a:cs typeface="Courier New" panose="02070309020205020404" pitchFamily="49" charset="0"/>
               </a:rPr>
@@ -7704,13 +7756,25 @@
             </a:r>
             <a:r>
               <a:rPr lang="en-US" dirty="0">
-                <a:latin typeface="Courier New" panose="02070309020205020404" pitchFamily="49" charset="0"/>
-                <a:cs typeface="Courier New" panose="02070309020205020404" pitchFamily="49" charset="0"/>
-                <a:hlinkClick r:id="rId2"/>
+                <a:solidFill>
+                  <a:srgbClr val="3F115C"/>
+                </a:solidFill>
+                <a:latin typeface="Courier New" panose="02070309020205020404" pitchFamily="49" charset="0"/>
+                <a:cs typeface="Courier New" panose="02070309020205020404" pitchFamily="49" charset="0"/>
+                <a:hlinkClick r:id="rId2">
+                  <a:extLst>
+                    <a:ext uri="{A12FA001-AC4F-418D-AE19-62706E023703}">
+                      <ahyp:hlinkClr xmlns:ahyp="http://schemas.microsoft.com/office/drawing/2018/hyperlinkcolor" val="tx"/>
+                    </a:ext>
+                  </a:extLst>
+                </a:hlinkClick>
               </a:rPr>
               <a:t>https://login.microsoftonline.com/{tenant-id}/oauth2/v2.0/token</a:t>
             </a:r>
             <a:endParaRPr lang="en-US" dirty="0">
+              <a:solidFill>
+                <a:srgbClr val="3F115C"/>
+              </a:solidFill>
               <a:latin typeface="Courier New" panose="02070309020205020404" pitchFamily="49" charset="0"/>
               <a:cs typeface="Courier New" panose="02070309020205020404" pitchFamily="49" charset="0"/>
             </a:endParaRPr>
@@ -7718,6 +7782,9 @@
           <a:p>
             <a:r>
               <a:rPr lang="en-US" dirty="0">
+                <a:solidFill>
+                  <a:srgbClr val="3F115C"/>
+                </a:solidFill>
                 <a:latin typeface="Courier New" panose="02070309020205020404" pitchFamily="49" charset="0"/>
                 <a:cs typeface="Courier New" panose="02070309020205020404" pitchFamily="49" charset="0"/>
               </a:rPr>
@@ -7725,25 +7792,57 @@
             </a:r>
             <a:r>
               <a:rPr lang="en-US" dirty="0" err="1">
+                <a:solidFill>
+                  <a:srgbClr val="3F115C"/>
+                </a:solidFill>
                 <a:latin typeface="Courier New" panose="02070309020205020404" pitchFamily="49" charset="0"/>
                 <a:cs typeface="Courier New" panose="02070309020205020404" pitchFamily="49" charset="0"/>
               </a:rPr>
               <a:t>urlencoded</a:t>
             </a:r>
             <a:endParaRPr lang="en-US" dirty="0">
+              <a:solidFill>
+                <a:srgbClr val="3F115C"/>
+              </a:solidFill>
               <a:latin typeface="Courier New" panose="02070309020205020404" pitchFamily="49" charset="0"/>
               <a:cs typeface="Courier New" panose="02070309020205020404" pitchFamily="49" charset="0"/>
             </a:endParaRPr>
           </a:p>
           <a:p>
             <a:endParaRPr lang="en-US" dirty="0">
+              <a:solidFill>
+                <a:srgbClr val="3F115C"/>
+              </a:solidFill>
               <a:latin typeface="Courier New" panose="02070309020205020404" pitchFamily="49" charset="0"/>
               <a:cs typeface="Courier New" panose="02070309020205020404" pitchFamily="49" charset="0"/>
             </a:endParaRPr>
           </a:p>
           <a:p>
             <a:r>
+              <a:rPr lang="en-US" b="1" dirty="0" err="1">
+                <a:solidFill>
+                  <a:srgbClr val="3F115C"/>
+                </a:solidFill>
+                <a:latin typeface="Courier New" panose="02070309020205020404" pitchFamily="49" charset="0"/>
+                <a:cs typeface="Courier New" panose="02070309020205020404" pitchFamily="49" charset="0"/>
+              </a:rPr>
+              <a:t>client_id</a:t>
+            </a:r>
+            <a:r>
+              <a:rPr lang="en-US" dirty="0">
+                <a:solidFill>
+                  <a:srgbClr val="3F115C"/>
+                </a:solidFill>
+                <a:latin typeface="Courier New" panose="02070309020205020404" pitchFamily="49" charset="0"/>
+                <a:cs typeface="Courier New" panose="02070309020205020404" pitchFamily="49" charset="0"/>
+              </a:rPr>
+              <a:t>={</a:t>
+            </a:r>
+            <a:r>
               <a:rPr lang="en-US" dirty="0" err="1">
+                <a:solidFill>
+                  <a:srgbClr val="3F115C"/>
+                </a:solidFill>
                 <a:latin typeface="Courier New" panose="02070309020205020404" pitchFamily="49" charset="0"/>
                 <a:cs typeface="Courier New" panose="02070309020205020404" pitchFamily="49" charset="0"/>
               </a:rPr>
@@ -7751,6 +7850,38 @@
             </a:r>
             <a:r>
               <a:rPr lang="en-US" dirty="0">
+                <a:solidFill>
+                  <a:srgbClr val="3F115C"/>
+                </a:solidFill>
+                <a:latin typeface="Courier New" panose="02070309020205020404" pitchFamily="49" charset="0"/>
+                <a:cs typeface="Courier New" panose="02070309020205020404" pitchFamily="49" charset="0"/>
+              </a:rPr>
+              <a:t>},</a:t>
+            </a:r>
+            <a:br>
+              <a:rPr lang="en-US" dirty="0">
+                <a:solidFill>
+                  <a:srgbClr val="3F115C"/>
+                </a:solidFill>
+                <a:latin typeface="Courier New" panose="02070309020205020404" pitchFamily="49" charset="0"/>
+                <a:cs typeface="Courier New" panose="02070309020205020404" pitchFamily="49" charset="0"/>
+              </a:rPr>
+            </a:br>
+            <a:r>
+              <a:rPr lang="en-US" b="1" dirty="0" err="1">
+                <a:solidFill>
+                  <a:srgbClr val="3F115C"/>
+                </a:solidFill>
+                <a:latin typeface="Courier New" panose="02070309020205020404" pitchFamily="49" charset="0"/>
+                <a:cs typeface="Courier New" panose="02070309020205020404" pitchFamily="49" charset="0"/>
+              </a:rPr>
+              <a:t>client_secret</a:t>
+            </a:r>
+            <a:r>
+              <a:rPr lang="en-US" dirty="0">
+                <a:solidFill>
+                  <a:srgbClr val="3F115C"/>
+                </a:solidFill>
                 <a:latin typeface="Courier New" panose="02070309020205020404" pitchFamily="49" charset="0"/>
                 <a:cs typeface="Courier New" panose="02070309020205020404" pitchFamily="49" charset="0"/>
               </a:rPr>
@@ -7758,27 +7889,125 @@
             </a:r>
             <a:r>
               <a:rPr lang="en-US" dirty="0" err="1">
-                <a:latin typeface="Courier New" panose="02070309020205020404" pitchFamily="49" charset="0"/>
-                <a:cs typeface="Courier New" panose="02070309020205020404" pitchFamily="49" charset="0"/>
-              </a:rPr>
-              <a:t>client_id</a:t>
+                <a:solidFill>
+                  <a:srgbClr val="3F115C"/>
+                </a:solidFill>
+                <a:latin typeface="Courier New" panose="02070309020205020404" pitchFamily="49" charset="0"/>
+                <a:cs typeface="Courier New" panose="02070309020205020404" pitchFamily="49" charset="0"/>
+              </a:rPr>
+              <a:t>client_secret</a:t>
             </a:r>
             <a:r>
               <a:rPr lang="en-US" dirty="0">
+                <a:solidFill>
+                  <a:srgbClr val="3F115C"/>
+                </a:solidFill>
                 <a:latin typeface="Courier New" panose="02070309020205020404" pitchFamily="49" charset="0"/>
                 <a:cs typeface="Courier New" panose="02070309020205020404" pitchFamily="49" charset="0"/>
               </a:rPr>
               <a:t>},</a:t>
             </a:r>
+          </a:p>
+          <a:p>
+            <a:r>
+              <a:rPr lang="en-US" b="1" dirty="0" err="1">
+                <a:solidFill>
+                  <a:srgbClr val="3F115C"/>
+                </a:solidFill>
+                <a:latin typeface="Courier New" panose="02070309020205020404" pitchFamily="49" charset="0"/>
+                <a:cs typeface="Courier New" panose="02070309020205020404" pitchFamily="49" charset="0"/>
+              </a:rPr>
+              <a:t>grant_type</a:t>
+            </a:r>
+            <a:r>
+              <a:rPr lang="en-US" dirty="0">
+                <a:solidFill>
+                  <a:srgbClr val="3F115C"/>
+                </a:solidFill>
+                <a:latin typeface="Courier New" panose="02070309020205020404" pitchFamily="49" charset="0"/>
+                <a:cs typeface="Courier New" panose="02070309020205020404" pitchFamily="49" charset="0"/>
+              </a:rPr>
+              <a:t>=</a:t>
+            </a:r>
             <a:r>
               <a:rPr lang="en-US" dirty="0" err="1">
-                <a:latin typeface="Courier New" panose="02070309020205020404" pitchFamily="49" charset="0"/>
-                <a:cs typeface="Courier New" panose="02070309020205020404" pitchFamily="49" charset="0"/>
-              </a:rPr>
-              <a:t>client_secret</a:t>
+                <a:solidFill>
+                  <a:srgbClr val="3F115C"/>
+                </a:solidFill>
+                <a:latin typeface="Courier New" panose="02070309020205020404" pitchFamily="49" charset="0"/>
+                <a:cs typeface="Courier New" panose="02070309020205020404" pitchFamily="49" charset="0"/>
+              </a:rPr>
+              <a:t>urn:ietf:params:oauth:grant-type:jwt-bearer</a:t>
             </a:r>
             <a:r>
               <a:rPr lang="en-US" dirty="0">
+                <a:solidFill>
+                  <a:srgbClr val="3F115C"/>
+                </a:solidFill>
+                <a:latin typeface="Courier New" panose="02070309020205020404" pitchFamily="49" charset="0"/>
+                <a:cs typeface="Courier New" panose="02070309020205020404" pitchFamily="49" charset="0"/>
+              </a:rPr>
+              <a:t>,</a:t>
+            </a:r>
+          </a:p>
+          <a:p>
+            <a:r>
+              <a:rPr lang="en-US" b="1" dirty="0" err="1">
+                <a:solidFill>
+                  <a:srgbClr val="3F115C"/>
+                </a:solidFill>
+                <a:latin typeface="Courier New" panose="02070309020205020404" pitchFamily="49" charset="0"/>
+                <a:cs typeface="Courier New" panose="02070309020205020404" pitchFamily="49" charset="0"/>
+              </a:rPr>
+              <a:t>requested_token_use</a:t>
+            </a:r>
+            <a:r>
+              <a:rPr lang="en-US" dirty="0">
+                <a:solidFill>
+                  <a:srgbClr val="3F115C"/>
+                </a:solidFill>
+                <a:latin typeface="Courier New" panose="02070309020205020404" pitchFamily="49" charset="0"/>
+                <a:cs typeface="Courier New" panose="02070309020205020404" pitchFamily="49" charset="0"/>
+              </a:rPr>
+              <a:t>=</a:t>
+            </a:r>
+            <a:r>
+              <a:rPr lang="en-US" dirty="0" err="1">
+                <a:solidFill>
+                  <a:srgbClr val="3F115C"/>
+                </a:solidFill>
+                <a:latin typeface="Courier New" panose="02070309020205020404" pitchFamily="49" charset="0"/>
+                <a:cs typeface="Courier New" panose="02070309020205020404" pitchFamily="49" charset="0"/>
+              </a:rPr>
+              <a:t>on_behalf_of</a:t>
+            </a:r>
+            <a:r>
+              <a:rPr lang="en-US" dirty="0">
+                <a:solidFill>
+                  <a:srgbClr val="3F115C"/>
+                </a:solidFill>
+                <a:latin typeface="Courier New" panose="02070309020205020404" pitchFamily="49" charset="0"/>
+                <a:cs typeface="Courier New" panose="02070309020205020404" pitchFamily="49" charset="0"/>
+              </a:rPr>
+              <a:t>,</a:t>
+            </a:r>
+          </a:p>
+          <a:p>
+            <a:r>
+              <a:rPr lang="en-US" b="1" dirty="0">
+                <a:solidFill>
+                  <a:srgbClr val="3F115C"/>
+                </a:solidFill>
+                <a:latin typeface="Courier New" panose="02070309020205020404" pitchFamily="49" charset="0"/>
+                <a:cs typeface="Courier New" panose="02070309020205020404" pitchFamily="49" charset="0"/>
+              </a:rPr>
+              <a:t>assertion</a:t>
+            </a:r>
+            <a:r>
+              <a:rPr lang="en-US" dirty="0">
+                <a:solidFill>
+                  <a:srgbClr val="3F115C"/>
+                </a:solidFill>
                 <a:latin typeface="Courier New" panose="02070309020205020404" pitchFamily="49" charset="0"/>
                 <a:cs typeface="Courier New" panose="02070309020205020404" pitchFamily="49" charset="0"/>
               </a:rPr>
@@ -7786,13 +8015,19 @@
             </a:r>
             <a:r>
               <a:rPr lang="en-US" dirty="0" err="1">
-                <a:latin typeface="Courier New" panose="02070309020205020404" pitchFamily="49" charset="0"/>
-                <a:cs typeface="Courier New" panose="02070309020205020404" pitchFamily="49" charset="0"/>
-              </a:rPr>
-              <a:t>client_secret</a:t>
+                <a:solidFill>
+                  <a:srgbClr val="3F115C"/>
+                </a:solidFill>
+                <a:latin typeface="Courier New" panose="02070309020205020404" pitchFamily="49" charset="0"/>
+                <a:cs typeface="Courier New" panose="02070309020205020404" pitchFamily="49" charset="0"/>
+              </a:rPr>
+              <a:t>sso_id_token</a:t>
             </a:r>
             <a:r>
               <a:rPr lang="en-US" dirty="0">
+                <a:solidFill>
+                  <a:srgbClr val="3F115C"/>
+                </a:solidFill>
                 <a:latin typeface="Courier New" panose="02070309020205020404" pitchFamily="49" charset="0"/>
                 <a:cs typeface="Courier New" panose="02070309020205020404" pitchFamily="49" charset="0"/>
               </a:rPr>
@@ -7801,137 +8036,89 @@
           </a:p>
           <a:p>
             <a:r>
+              <a:rPr lang="en-US" b="1" dirty="0">
+                <a:solidFill>
+                  <a:srgbClr val="3F115C"/>
+                </a:solidFill>
+                <a:latin typeface="Courier New" panose="02070309020205020404" pitchFamily="49" charset="0"/>
+                <a:cs typeface="Courier New" panose="02070309020205020404" pitchFamily="49" charset="0"/>
+              </a:rPr>
+              <a:t>scope</a:t>
+            </a:r>
+            <a:r>
+              <a:rPr lang="en-US" dirty="0">
+                <a:solidFill>
+                  <a:srgbClr val="3F115C"/>
+                </a:solidFill>
+                <a:latin typeface="Courier New" panose="02070309020205020404" pitchFamily="49" charset="0"/>
+                <a:cs typeface="Courier New" panose="02070309020205020404" pitchFamily="49" charset="0"/>
+              </a:rPr>
+              <a:t>=profile </a:t>
+            </a:r>
+            <a:r>
               <a:rPr lang="en-US" dirty="0" err="1">
-                <a:latin typeface="Courier New" panose="02070309020205020404" pitchFamily="49" charset="0"/>
-                <a:cs typeface="Courier New" panose="02070309020205020404" pitchFamily="49" charset="0"/>
-              </a:rPr>
-              <a:t>grant_type</a:t>
+                <a:solidFill>
+                  <a:srgbClr val="3F115C"/>
+                </a:solidFill>
+                <a:latin typeface="Courier New" panose="02070309020205020404" pitchFamily="49" charset="0"/>
+                <a:cs typeface="Courier New" panose="02070309020205020404" pitchFamily="49" charset="0"/>
+              </a:rPr>
+              <a:t>openid</a:t>
             </a:r>
             <a:r>
               <a:rPr lang="en-US" dirty="0">
-                <a:latin typeface="Courier New" panose="02070309020205020404" pitchFamily="49" charset="0"/>
-                <a:cs typeface="Courier New" panose="02070309020205020404" pitchFamily="49" charset="0"/>
-              </a:rPr>
-              <a:t>=</a:t>
+                <a:solidFill>
+                  <a:srgbClr val="3F115C"/>
+                </a:solidFill>
+                <a:latin typeface="Courier New" panose="02070309020205020404" pitchFamily="49" charset="0"/>
+                <a:cs typeface="Courier New" panose="02070309020205020404" pitchFamily="49" charset="0"/>
+              </a:rPr>
+              <a:t> </a:t>
             </a:r>
             <a:r>
               <a:rPr lang="en-US" dirty="0" err="1">
-                <a:latin typeface="Courier New" panose="02070309020205020404" pitchFamily="49" charset="0"/>
-                <a:cs typeface="Courier New" panose="02070309020205020404" pitchFamily="49" charset="0"/>
-              </a:rPr>
-              <a:t>urn:ietf:params:oauth:grant-type:jwt-bearer</a:t>
+                <a:solidFill>
+                  <a:srgbClr val="3F115C"/>
+                </a:solidFill>
+                <a:latin typeface="Courier New" panose="02070309020205020404" pitchFamily="49" charset="0"/>
+                <a:cs typeface="Courier New" panose="02070309020205020404" pitchFamily="49" charset="0"/>
+              </a:rPr>
+              <a:t>User.Read</a:t>
             </a:r>
             <a:r>
               <a:rPr lang="en-US" dirty="0">
-                <a:latin typeface="Courier New" panose="02070309020205020404" pitchFamily="49" charset="0"/>
-                <a:cs typeface="Courier New" panose="02070309020205020404" pitchFamily="49" charset="0"/>
-              </a:rPr>
-              <a:t>,</a:t>
-            </a:r>
-          </a:p>
-          <a:p>
+                <a:solidFill>
+                  <a:srgbClr val="3F115C"/>
+                </a:solidFill>
+                <a:latin typeface="Courier New" panose="02070309020205020404" pitchFamily="49" charset="0"/>
+                <a:cs typeface="Courier New" panose="02070309020205020404" pitchFamily="49" charset="0"/>
+              </a:rPr>
+              <a:t> </a:t>
+            </a:r>
             <a:r>
               <a:rPr lang="en-US" dirty="0" err="1">
-                <a:latin typeface="Courier New" panose="02070309020205020404" pitchFamily="49" charset="0"/>
-                <a:cs typeface="Courier New" panose="02070309020205020404" pitchFamily="49" charset="0"/>
-              </a:rPr>
-              <a:t>requested_token_use</a:t>
-            </a:r>
-            <a:r>
-              <a:rPr lang="en-US" dirty="0">
-                <a:latin typeface="Courier New" panose="02070309020205020404" pitchFamily="49" charset="0"/>
-                <a:cs typeface="Courier New" panose="02070309020205020404" pitchFamily="49" charset="0"/>
-              </a:rPr>
-              <a:t>=</a:t>
-            </a:r>
-            <a:r>
-              <a:rPr lang="en-US" dirty="0" err="1">
-                <a:latin typeface="Courier New" panose="02070309020205020404" pitchFamily="49" charset="0"/>
-                <a:cs typeface="Courier New" panose="02070309020205020404" pitchFamily="49" charset="0"/>
-              </a:rPr>
-              <a:t>on_behalf_of</a:t>
-            </a:r>
-            <a:r>
-              <a:rPr lang="en-US" dirty="0">
-                <a:latin typeface="Courier New" panose="02070309020205020404" pitchFamily="49" charset="0"/>
-                <a:cs typeface="Courier New" panose="02070309020205020404" pitchFamily="49" charset="0"/>
-              </a:rPr>
-              <a:t>,</a:t>
-            </a:r>
-          </a:p>
-          <a:p>
-            <a:r>
-              <a:rPr lang="en-US" dirty="0">
-                <a:latin typeface="Courier New" panose="02070309020205020404" pitchFamily="49" charset="0"/>
-                <a:cs typeface="Courier New" panose="02070309020205020404" pitchFamily="49" charset="0"/>
-              </a:rPr>
-              <a:t>assertion={</a:t>
-            </a:r>
-            <a:r>
-              <a:rPr lang="en-US" dirty="0" err="1">
-                <a:latin typeface="Courier New" panose="02070309020205020404" pitchFamily="49" charset="0"/>
-                <a:cs typeface="Courier New" panose="02070309020205020404" pitchFamily="49" charset="0"/>
-              </a:rPr>
-              <a:t>sso_id_token</a:t>
-            </a:r>
-            <a:r>
-              <a:rPr lang="en-US" dirty="0">
-                <a:latin typeface="Courier New" panose="02070309020205020404" pitchFamily="49" charset="0"/>
-                <a:cs typeface="Courier New" panose="02070309020205020404" pitchFamily="49" charset="0"/>
-              </a:rPr>
-              <a:t>},</a:t>
-            </a:r>
-          </a:p>
-          <a:p>
-            <a:r>
-              <a:rPr lang="en-US" dirty="0">
-                <a:latin typeface="Courier New" panose="02070309020205020404" pitchFamily="49" charset="0"/>
-                <a:cs typeface="Courier New" panose="02070309020205020404" pitchFamily="49" charset="0"/>
-              </a:rPr>
-              <a:t>scope=profile </a:t>
-            </a:r>
-            <a:r>
-              <a:rPr lang="en-US" dirty="0" err="1">
-                <a:latin typeface="Courier New" panose="02070309020205020404" pitchFamily="49" charset="0"/>
-                <a:cs typeface="Courier New" panose="02070309020205020404" pitchFamily="49" charset="0"/>
-              </a:rPr>
-              <a:t>openid</a:t>
-            </a:r>
-            <a:r>
-              <a:rPr lang="en-US" dirty="0">
-                <a:latin typeface="Courier New" panose="02070309020205020404" pitchFamily="49" charset="0"/>
-                <a:cs typeface="Courier New" panose="02070309020205020404" pitchFamily="49" charset="0"/>
-              </a:rPr>
-              <a:t> </a:t>
-            </a:r>
-            <a:r>
-              <a:rPr lang="en-US" dirty="0" err="1">
-                <a:latin typeface="Courier New" panose="02070309020205020404" pitchFamily="49" charset="0"/>
-                <a:cs typeface="Courier New" panose="02070309020205020404" pitchFamily="49" charset="0"/>
-              </a:rPr>
-              <a:t>User.Read</a:t>
-            </a:r>
-            <a:r>
-              <a:rPr lang="en-US" dirty="0">
-                <a:latin typeface="Courier New" panose="02070309020205020404" pitchFamily="49" charset="0"/>
-                <a:cs typeface="Courier New" panose="02070309020205020404" pitchFamily="49" charset="0"/>
-              </a:rPr>
-              <a:t> </a:t>
-            </a:r>
-            <a:r>
-              <a:rPr lang="en-US" dirty="0" err="1">
+                <a:solidFill>
+                  <a:srgbClr val="3F115C"/>
+                </a:solidFill>
                 <a:latin typeface="Courier New" panose="02070309020205020404" pitchFamily="49" charset="0"/>
                 <a:cs typeface="Courier New" panose="02070309020205020404" pitchFamily="49" charset="0"/>
               </a:rPr>
               <a:t>Mail.Read</a:t>
             </a:r>
             <a:endParaRPr lang="en-US" dirty="0">
+              <a:solidFill>
+                <a:srgbClr val="3F115C"/>
+              </a:solidFill>
               <a:latin typeface="Courier New" panose="02070309020205020404" pitchFamily="49" charset="0"/>
               <a:cs typeface="Courier New" panose="02070309020205020404" pitchFamily="49" charset="0"/>
             </a:endParaRPr>
           </a:p>
           <a:p>
-            <a:endParaRPr lang="en-US" dirty="0"/>
+            <a:endParaRPr lang="en-US" dirty="0">
+              <a:solidFill>
+                <a:srgbClr val="3F115C"/>
+              </a:solidFill>
+            </a:endParaRPr>
           </a:p>
         </p:txBody>
       </p:sp>
@@ -12140,15 +12327,6 @@
 </file>
 
 <file path=customXml/item2.xml><?xml version="1.0" encoding="utf-8"?>
-<?mso-contentType ?>
-<FormTemplates xmlns="http://schemas.microsoft.com/sharepoint/v3/contenttype/forms">
-  <Display>DocumentLibraryForm</Display>
-  <Edit>DocumentLibraryForm</Edit>
-  <New>DocumentLibraryForm</New>
-</FormTemplates>
-</file>
-
-<file path=customXml/item3.xml><?xml version="1.0" encoding="utf-8"?>
 <ct:contentTypeSchema xmlns:ct="http://schemas.microsoft.com/office/2006/metadata/contentType" xmlns:ma="http://schemas.microsoft.com/office/2006/metadata/properties/metaAttributes" ct:_="" ma:_="" ma:contentTypeName="Document" ma:contentTypeID="0x010100F09820594E7B0041BAC4DECBBC892FF9" ma:contentTypeVersion="8" ma:contentTypeDescription="Create a new document." ma:contentTypeScope="" ma:versionID="a4814d1cc1d58eee3ea03778ca413c81">
   <xsd:schema xmlns:xsd="http://www.w3.org/2001/XMLSchema" xmlns:xs="http://www.w3.org/2001/XMLSchema" xmlns:p="http://schemas.microsoft.com/office/2006/metadata/properties" xmlns:ns2="61b79488-63fd-46f4-b1bf-09cb63d2085e" targetNamespace="http://schemas.microsoft.com/office/2006/metadata/properties" ma:root="true" ma:fieldsID="40fb5444c5ccb72d5b900b723022c04a" ns2:_="">
     <xsd:import namespace="61b79488-63fd-46f4-b1bf-09cb63d2085e"/>
@@ -12320,6 +12498,15 @@
 </ct:contentTypeSchema>
 </file>
 
+<file path=customXml/item3.xml><?xml version="1.0" encoding="utf-8"?>
+<?mso-contentType ?>
+<FormTemplates xmlns="http://schemas.microsoft.com/sharepoint/v3/contenttype/forms">
+  <Display>DocumentLibraryForm</Display>
+  <Edit>DocumentLibraryForm</Edit>
+  <New>DocumentLibraryForm</New>
+</FormTemplates>
+</file>
+
 <file path=customXml/itemProps1.xml><?xml version="1.0" encoding="utf-8"?>
 <ds:datastoreItem xmlns:ds="http://schemas.openxmlformats.org/officeDocument/2006/customXml" ds:itemID="{56E9BD92-A245-451A-82D6-41724A6593BA}">
   <ds:schemaRefs>
@@ -12337,14 +12524,6 @@
 </file>
 
 <file path=customXml/itemProps2.xml><?xml version="1.0" encoding="utf-8"?>
-<ds:datastoreItem xmlns:ds="http://schemas.openxmlformats.org/officeDocument/2006/customXml" ds:itemID="{4875BE8C-CB08-400E-A21F-2497FF16C77B}">
-  <ds:schemaRefs>
-    <ds:schemaRef ds:uri="http://schemas.microsoft.com/sharepoint/v3/contenttype/forms"/>
-  </ds:schemaRefs>
-</ds:datastoreItem>
-</file>
-
-<file path=customXml/itemProps3.xml><?xml version="1.0" encoding="utf-8"?>
 <ds:datastoreItem xmlns:ds="http://schemas.openxmlformats.org/officeDocument/2006/customXml" ds:itemID="{535C360C-FC5A-43F7-BF1D-FA69DEF501D3}">
   <ds:schemaRefs>
     <ds:schemaRef ds:uri="http://schemas.microsoft.com/office/2006/metadata/contentType"/>
@@ -12362,6 +12541,14 @@
 </ds:datastoreItem>
 </file>
 
+<file path=customXml/itemProps3.xml><?xml version="1.0" encoding="utf-8"?>
+<ds:datastoreItem xmlns:ds="http://schemas.openxmlformats.org/officeDocument/2006/customXml" ds:itemID="{4875BE8C-CB08-400E-A21F-2497FF16C77B}">
+  <ds:schemaRefs>
+    <ds:schemaRef ds:uri="http://schemas.microsoft.com/sharepoint/v3/contenttype/forms"/>
+  </ds:schemaRefs>
+</ds:datastoreItem>
+</file>
+
 <file path=docMetadata/LabelInfo.xml><?xml version="1.0" encoding="utf-8"?>
 <clbl:labelList xmlns:clbl="http://schemas.microsoft.com/office/2020/mipLabelMetadata">
   <clbl:label id="{f42aa342-8706-4288-bd11-ebb85995028c}" enabled="1" method="Standard" siteId="{72f988bf-86f1-41af-91ab-2d7cd011db47}" removed="0"/>

</xml_diff>

<commit_message>
FY23Q3 refresh - msteams-sso
- run through all exercise steps in associated MSLearn module to validate good working order
- updated steps & fixed typos where necessary
- updated slides where necessary
- update code samples to reflect MSLearn HOL exercise refresh & updates
- any & all users/names/company names/pictures/IDs are not real people/tenants... all are from M365 demo tenants provided by Microsoft
</commit_message>
<xml_diff>
--- a/Teams/80 Using Single Sign-On with Microsoft Teams/slides.pptx
+++ b/Teams/80 Using Single Sign-On with Microsoft Teams/slides.pptx
@@ -292,7 +292,7 @@
           <a:p>
             <a:fld id="{F5D67128-0ED3-F84C-AB75-26956BD6F773}" type="datetimeFigureOut">
               <a:rPr lang="en-US" smtClean="0"/>
-              <a:t>12/4/22</a:t>
+              <a:t>12/12/22</a:t>
             </a:fld>
             <a:endParaRPr lang="en-US"/>
           </a:p>
@@ -469,7 +469,7 @@
           <a:p>
             <a:fld id="{9E65F564-29A8-0243-B41B-CCCF740F82F1}" type="datetimeFigureOut">
               <a:rPr lang="en-US" smtClean="0"/>
-              <a:t>12/4/22</a:t>
+              <a:t>12/12/22</a:t>
             </a:fld>
             <a:endParaRPr lang="en-US"/>
           </a:p>
@@ -9679,10 +9679,18 @@
                 <a:latin typeface="Courier New" panose="02070309020205020404" pitchFamily="49" charset="0"/>
                 <a:cs typeface="Courier New" panose="02070309020205020404" pitchFamily="49" charset="0"/>
               </a:rPr>
-              <a:t>(MAIN_WATERFALL_DIALOG, [</a:t>
-            </a:r>
-          </a:p>
-          <a:p>
+              <a:t>(‘</a:t>
+            </a:r>
+            <a:r>
+              <a:rPr lang="en-US" dirty="0" err="1">
+                <a:solidFill>
+                  <a:srgbClr val="3F115C"/>
+                </a:solidFill>
+                <a:latin typeface="Courier New" panose="02070309020205020404" pitchFamily="49" charset="0"/>
+                <a:cs typeface="Courier New" panose="02070309020205020404" pitchFamily="49" charset="0"/>
+              </a:rPr>
+              <a:t>MainDialog</a:t>
+            </a:r>
             <a:r>
               <a:rPr lang="en-US" dirty="0">
                 <a:solidFill>
@@ -9691,6 +9699,18 @@
                 <a:latin typeface="Courier New" panose="02070309020205020404" pitchFamily="49" charset="0"/>
                 <a:cs typeface="Courier New" panose="02070309020205020404" pitchFamily="49" charset="0"/>
               </a:rPr>
+              <a:t>’, [</a:t>
+            </a:r>
+          </a:p>
+          <a:p>
+            <a:r>
+              <a:rPr lang="en-US" dirty="0">
+                <a:solidFill>
+                  <a:srgbClr val="3F115C"/>
+                </a:solidFill>
+                <a:latin typeface="Courier New" panose="02070309020205020404" pitchFamily="49" charset="0"/>
+                <a:cs typeface="Courier New" panose="02070309020205020404" pitchFamily="49" charset="0"/>
+              </a:rPr>
               <a:t>    </a:t>
             </a:r>
             <a:r>
@@ -9733,7 +9753,7 @@
                 <a:latin typeface="Courier New" panose="02070309020205020404" pitchFamily="49" charset="0"/>
                 <a:cs typeface="Courier New" panose="02070309020205020404" pitchFamily="49" charset="0"/>
               </a:rPr>
-              <a:t>this.loginStep.bind</a:t>
+              <a:t>this.displayMSGraphDataStep.bind</a:t>
             </a:r>
             <a:r>
               <a:rPr lang="en-US" dirty="0">
@@ -9872,7 +9892,43 @@
                 <a:latin typeface="Courier New" panose="02070309020205020404" pitchFamily="49" charset="0"/>
                 <a:cs typeface="Courier New" panose="02070309020205020404" pitchFamily="49" charset="0"/>
               </a:rPr>
-              <a:t>(OAUTH_PROMPT);</a:t>
+              <a:t>(’</a:t>
+            </a:r>
+            <a:r>
+              <a:rPr lang="en-US" dirty="0" err="1">
+                <a:solidFill>
+                  <a:srgbClr val="3F115C"/>
+                </a:solidFill>
+                <a:latin typeface="Courier New" panose="02070309020205020404" pitchFamily="49" charset="0"/>
+                <a:cs typeface="Courier New" panose="02070309020205020404" pitchFamily="49" charset="0"/>
+              </a:rPr>
+              <a:t>OAuthPromp</a:t>
+            </a:r>
+            <a:r>
+              <a:rPr lang="en-US" dirty="0" err="1">
+                <a:solidFill>
+                  <a:srgbClr val="3F115C"/>
+                </a:solidFill>
+              </a:rPr>
+              <a:t>t</a:t>
+            </a:r>
+            <a:r>
+              <a:rPr lang="en-US" dirty="0">
+                <a:solidFill>
+                  <a:srgbClr val="3F115C"/>
+                </a:solidFill>
+              </a:rPr>
+              <a:t>’</a:t>
+            </a:r>
+            <a:r>
+              <a:rPr lang="en-US" dirty="0">
+                <a:solidFill>
+                  <a:srgbClr val="3F115C"/>
+                </a:solidFill>
+                <a:latin typeface="Courier New" panose="02070309020205020404" pitchFamily="49" charset="0"/>
+                <a:cs typeface="Courier New" panose="02070309020205020404" pitchFamily="49" charset="0"/>
+              </a:rPr>
+              <a:t>);</a:t>
             </a:r>
           </a:p>
           <a:p>
@@ -9985,14 +10041,57 @@
                 <a:latin typeface="Courier New" panose="02070309020205020404" pitchFamily="49" charset="0"/>
                 <a:cs typeface="Courier New" panose="02070309020205020404" pitchFamily="49" charset="0"/>
               </a:rPr>
+              <a:t>// import { Client } from “@</a:t>
+            </a:r>
+            <a:r>
+              <a:rPr lang="en-US" dirty="0" err="1">
+                <a:latin typeface="Courier New" panose="02070309020205020404" pitchFamily="49" charset="0"/>
+                <a:cs typeface="Courier New" panose="02070309020205020404" pitchFamily="49" charset="0"/>
+              </a:rPr>
+              <a:t>microsoft</a:t>
+            </a:r>
+            <a:r>
+              <a:rPr lang="en-US" dirty="0">
+                <a:latin typeface="Courier New" panose="02070309020205020404" pitchFamily="49" charset="0"/>
+                <a:cs typeface="Courier New" panose="02070309020205020404" pitchFamily="49" charset="0"/>
+              </a:rPr>
+              <a:t>/</a:t>
+            </a:r>
+            <a:r>
+              <a:rPr lang="en-US" dirty="0" err="1">
+                <a:latin typeface="Courier New" panose="02070309020205020404" pitchFamily="49" charset="0"/>
+                <a:cs typeface="Courier New" panose="02070309020205020404" pitchFamily="49" charset="0"/>
+              </a:rPr>
+              <a:t>microsoft</a:t>
+            </a:r>
+            <a:r>
+              <a:rPr lang="en-US" dirty="0">
+                <a:latin typeface="Courier New" panose="02070309020205020404" pitchFamily="49" charset="0"/>
+                <a:cs typeface="Courier New" panose="02070309020205020404" pitchFamily="49" charset="0"/>
+              </a:rPr>
+              <a:t>-graph-client”;</a:t>
+            </a:r>
+          </a:p>
+          <a:p>
+            <a:pPr marL="0" indent="0">
+              <a:buNone/>
+            </a:pPr>
+            <a:r>
+              <a:rPr lang="en-US" dirty="0">
+                <a:latin typeface="Courier New" panose="02070309020205020404" pitchFamily="49" charset="0"/>
+                <a:cs typeface="Courier New" panose="02070309020205020404" pitchFamily="49" charset="0"/>
+              </a:rPr>
               <a:t>async </a:t>
             </a:r>
             <a:r>
               <a:rPr lang="en-US" dirty="0" err="1">
-                <a:latin typeface="Courier New" panose="02070309020205020404" pitchFamily="49" charset="0"/>
-                <a:cs typeface="Courier New" panose="02070309020205020404" pitchFamily="49" charset="0"/>
-              </a:rPr>
-              <a:t>loginStep</a:t>
+                <a:solidFill>
+                  <a:srgbClr val="3F115C"/>
+                </a:solidFill>
+                <a:latin typeface="Courier New" panose="02070309020205020404" pitchFamily="49" charset="0"/>
+                <a:cs typeface="Courier New" panose="02070309020205020404" pitchFamily="49" charset="0"/>
+              </a:rPr>
+              <a:t>displayMSGraphDataStep</a:t>
             </a:r>
             <a:r>
               <a:rPr lang="en-US" dirty="0">
@@ -10150,42 +10249,84 @@
                 <a:latin typeface="Courier New" panose="02070309020205020404" pitchFamily="49" charset="0"/>
                 <a:cs typeface="Courier New" panose="02070309020205020404" pitchFamily="49" charset="0"/>
               </a:rPr>
-              <a:t>microsoftGraphClient</a:t>
+              <a:t>msGraphClient</a:t>
             </a:r>
             <a:r>
               <a:rPr lang="en-US" dirty="0">
                 <a:latin typeface="Courier New" panose="02070309020205020404" pitchFamily="49" charset="0"/>
                 <a:cs typeface="Courier New" panose="02070309020205020404" pitchFamily="49" charset="0"/>
               </a:rPr>
-              <a:t> = new </a:t>
+              <a:t> = </a:t>
             </a:r>
             <a:r>
               <a:rPr lang="en-US" dirty="0" err="1">
                 <a:latin typeface="Courier New" panose="02070309020205020404" pitchFamily="49" charset="0"/>
                 <a:cs typeface="Courier New" panose="02070309020205020404" pitchFamily="49" charset="0"/>
               </a:rPr>
-              <a:t>MicrosoftGraphClient</a:t>
+              <a:t>Client.init</a:t>
             </a:r>
             <a:r>
               <a:rPr lang="en-US" dirty="0">
                 <a:latin typeface="Courier New" panose="02070309020205020404" pitchFamily="49" charset="0"/>
                 <a:cs typeface="Courier New" panose="02070309020205020404" pitchFamily="49" charset="0"/>
               </a:rPr>
-              <a:t>(</a:t>
+              <a:t>({ </a:t>
             </a:r>
             <a:r>
               <a:rPr lang="en-US" dirty="0" err="1">
                 <a:latin typeface="Courier New" panose="02070309020205020404" pitchFamily="49" charset="0"/>
                 <a:cs typeface="Courier New" panose="02070309020205020404" pitchFamily="49" charset="0"/>
               </a:rPr>
-              <a:t>tokenResponse.token</a:t>
+              <a:t>authProvider</a:t>
             </a:r>
             <a:r>
               <a:rPr lang="en-US" dirty="0">
                 <a:latin typeface="Courier New" panose="02070309020205020404" pitchFamily="49" charset="0"/>
                 <a:cs typeface="Courier New" panose="02070309020205020404" pitchFamily="49" charset="0"/>
               </a:rPr>
-              <a:t>);</a:t>
+              <a:t>: (</a:t>
+            </a:r>
+            <a:r>
+              <a:rPr lang="en-US" dirty="0" err="1">
+                <a:latin typeface="Courier New" panose="02070309020205020404" pitchFamily="49" charset="0"/>
+                <a:cs typeface="Courier New" panose="02070309020205020404" pitchFamily="49" charset="0"/>
+              </a:rPr>
+              <a:t>cb</a:t>
+            </a:r>
+            <a:r>
+              <a:rPr lang="en-US" dirty="0">
+                <a:latin typeface="Courier New" panose="02070309020205020404" pitchFamily="49" charset="0"/>
+                <a:cs typeface="Courier New" panose="02070309020205020404" pitchFamily="49" charset="0"/>
+              </a:rPr>
+              <a:t>) =&gt; { </a:t>
+            </a:r>
+            <a:r>
+              <a:rPr lang="en-US" dirty="0" err="1">
+                <a:latin typeface="Courier New" panose="02070309020205020404" pitchFamily="49" charset="0"/>
+                <a:cs typeface="Courier New" panose="02070309020205020404" pitchFamily="49" charset="0"/>
+              </a:rPr>
+              <a:t>cb</a:t>
+            </a:r>
+            <a:r>
+              <a:rPr lang="en-US" dirty="0">
+                <a:latin typeface="Courier New" panose="02070309020205020404" pitchFamily="49" charset="0"/>
+                <a:cs typeface="Courier New" panose="02070309020205020404" pitchFamily="49" charset="0"/>
+              </a:rPr>
+              <a:t>(null, </a:t>
+            </a:r>
+            <a:r>
+              <a:rPr lang="en-US" dirty="0" err="1">
+                <a:latin typeface="Courier New" panose="02070309020205020404" pitchFamily="49" charset="0"/>
+                <a:cs typeface="Courier New" panose="02070309020205020404" pitchFamily="49" charset="0"/>
+              </a:rPr>
+              <a:t>this.token</a:t>
+            </a:r>
+            <a:r>
+              <a:rPr lang="en-US" dirty="0">
+                <a:latin typeface="Courier New" panose="02070309020205020404" pitchFamily="49" charset="0"/>
+                <a:cs typeface="Courier New" panose="02070309020205020404" pitchFamily="49" charset="0"/>
+              </a:rPr>
+              <a:t>); } });</a:t>
             </a:r>
           </a:p>
           <a:p>
@@ -10222,14 +10363,14 @@
                 <a:latin typeface="Courier New" panose="02070309020205020404" pitchFamily="49" charset="0"/>
                 <a:cs typeface="Courier New" panose="02070309020205020404" pitchFamily="49" charset="0"/>
               </a:rPr>
-              <a:t>microsoftGraphClient.getMe</a:t>
+              <a:t>msGraphClient.api</a:t>
             </a:r>
             <a:r>
               <a:rPr lang="en-US" dirty="0">
                 <a:latin typeface="Courier New" panose="02070309020205020404" pitchFamily="49" charset="0"/>
                 <a:cs typeface="Courier New" panose="02070309020205020404" pitchFamily="49" charset="0"/>
               </a:rPr>
-              <a:t>();</a:t>
+              <a:t>(“me”).get();</a:t>
             </a:r>
           </a:p>
           <a:p>
@@ -12319,14 +12460,6 @@
 </file>
 
 <file path=customXml/item1.xml><?xml version="1.0" encoding="utf-8"?>
-<p:properties xmlns:p="http://schemas.microsoft.com/office/2006/metadata/properties" xmlns:xsi="http://www.w3.org/2001/XMLSchema-instance" xmlns:pc="http://schemas.microsoft.com/office/infopath/2007/PartnerControls">
-  <documentManagement>
-    <MediaServiceKeyPoints xmlns="61b79488-63fd-46f4-b1bf-09cb63d2085e" xsi:nil="true"/>
-  </documentManagement>
-</p:properties>
-</file>
-
-<file path=customXml/item2.xml><?xml version="1.0" encoding="utf-8"?>
 <ct:contentTypeSchema xmlns:ct="http://schemas.microsoft.com/office/2006/metadata/contentType" xmlns:ma="http://schemas.microsoft.com/office/2006/metadata/properties/metaAttributes" ct:_="" ma:_="" ma:contentTypeName="Document" ma:contentTypeID="0x010100F09820594E7B0041BAC4DECBBC892FF9" ma:contentTypeVersion="8" ma:contentTypeDescription="Create a new document." ma:contentTypeScope="" ma:versionID="a4814d1cc1d58eee3ea03778ca413c81">
   <xsd:schema xmlns:xsd="http://www.w3.org/2001/XMLSchema" xmlns:xs="http://www.w3.org/2001/XMLSchema" xmlns:p="http://schemas.microsoft.com/office/2006/metadata/properties" xmlns:ns2="61b79488-63fd-46f4-b1bf-09cb63d2085e" targetNamespace="http://schemas.microsoft.com/office/2006/metadata/properties" ma:root="true" ma:fieldsID="40fb5444c5ccb72d5b900b723022c04a" ns2:_="">
     <xsd:import namespace="61b79488-63fd-46f4-b1bf-09cb63d2085e"/>
@@ -12498,6 +12631,14 @@
 </ct:contentTypeSchema>
 </file>
 
+<file path=customXml/item2.xml><?xml version="1.0" encoding="utf-8"?>
+<p:properties xmlns:p="http://schemas.microsoft.com/office/2006/metadata/properties" xmlns:xsi="http://www.w3.org/2001/XMLSchema-instance" xmlns:pc="http://schemas.microsoft.com/office/infopath/2007/PartnerControls">
+  <documentManagement>
+    <MediaServiceKeyPoints xmlns="61b79488-63fd-46f4-b1bf-09cb63d2085e" xsi:nil="true"/>
+  </documentManagement>
+</p:properties>
+</file>
+
 <file path=customXml/item3.xml><?xml version="1.0" encoding="utf-8"?>
 <?mso-contentType ?>
 <FormTemplates xmlns="http://schemas.microsoft.com/sharepoint/v3/contenttype/forms">
@@ -12508,22 +12649,6 @@
 </file>
 
 <file path=customXml/itemProps1.xml><?xml version="1.0" encoding="utf-8"?>
-<ds:datastoreItem xmlns:ds="http://schemas.openxmlformats.org/officeDocument/2006/customXml" ds:itemID="{56E9BD92-A245-451A-82D6-41724A6593BA}">
-  <ds:schemaRefs>
-    <ds:schemaRef ds:uri="http://purl.org/dc/elements/1.1/"/>
-    <ds:schemaRef ds:uri="http://schemas.microsoft.com/office/2006/documentManagement/types"/>
-    <ds:schemaRef ds:uri="http://purl.org/dc/dcmitype/"/>
-    <ds:schemaRef ds:uri="http://schemas.microsoft.com/office/infopath/2007/PartnerControls"/>
-    <ds:schemaRef ds:uri="http://schemas.openxmlformats.org/package/2006/metadata/core-properties"/>
-    <ds:schemaRef ds:uri="http://purl.org/dc/terms/"/>
-    <ds:schemaRef ds:uri="http://schemas.microsoft.com/office/2006/metadata/properties"/>
-    <ds:schemaRef ds:uri="http://www.w3.org/XML/1998/namespace"/>
-    <ds:schemaRef ds:uri="61b79488-63fd-46f4-b1bf-09cb63d2085e"/>
-  </ds:schemaRefs>
-</ds:datastoreItem>
-</file>
-
-<file path=customXml/itemProps2.xml><?xml version="1.0" encoding="utf-8"?>
 <ds:datastoreItem xmlns:ds="http://schemas.openxmlformats.org/officeDocument/2006/customXml" ds:itemID="{535C360C-FC5A-43F7-BF1D-FA69DEF501D3}">
   <ds:schemaRefs>
     <ds:schemaRef ds:uri="http://schemas.microsoft.com/office/2006/metadata/contentType"/>
@@ -12541,6 +12666,22 @@
 </ds:datastoreItem>
 </file>
 
+<file path=customXml/itemProps2.xml><?xml version="1.0" encoding="utf-8"?>
+<ds:datastoreItem xmlns:ds="http://schemas.openxmlformats.org/officeDocument/2006/customXml" ds:itemID="{56E9BD92-A245-451A-82D6-41724A6593BA}">
+  <ds:schemaRefs>
+    <ds:schemaRef ds:uri="http://purl.org/dc/elements/1.1/"/>
+    <ds:schemaRef ds:uri="http://schemas.microsoft.com/office/2006/documentManagement/types"/>
+    <ds:schemaRef ds:uri="http://purl.org/dc/dcmitype/"/>
+    <ds:schemaRef ds:uri="http://schemas.microsoft.com/office/infopath/2007/PartnerControls"/>
+    <ds:schemaRef ds:uri="http://schemas.openxmlformats.org/package/2006/metadata/core-properties"/>
+    <ds:schemaRef ds:uri="http://purl.org/dc/terms/"/>
+    <ds:schemaRef ds:uri="http://schemas.microsoft.com/office/2006/metadata/properties"/>
+    <ds:schemaRef ds:uri="http://www.w3.org/XML/1998/namespace"/>
+    <ds:schemaRef ds:uri="61b79488-63fd-46f4-b1bf-09cb63d2085e"/>
+  </ds:schemaRefs>
+</ds:datastoreItem>
+</file>
+
 <file path=customXml/itemProps3.xml><?xml version="1.0" encoding="utf-8"?>
 <ds:datastoreItem xmlns:ds="http://schemas.openxmlformats.org/officeDocument/2006/customXml" ds:itemID="{4875BE8C-CB08-400E-A21F-2497FF16C77B}">
   <ds:schemaRefs>

</xml_diff>